<commit_message>
add ability to rotate x labels
</commit_message>
<xml_diff>
--- a/notebooks/bar_chart.pptx
+++ b/notebooks/bar_chart.pptx
@@ -234,7 +234,7 @@
           </a:ln>
         </c:spPr>
         <c:txPr>
-          <a:bodyPr/>
+          <a:bodyPr rot="-2700000"/>
           <a:lstStyle/>
           <a:p>
             <a:pPr>
@@ -278,6 +278,17 @@
   <c:externalData r:id="rId1">
     <c:autoUpdate val="0"/>
   </c:externalData>
+  <c:layout val="inner">
+    <c:manualLayout>
+      <c:layoutTarget val="inner"/>
+      <c:xMode val="edge"/>
+      <c:yMode val="edge"/>
+      <c:x val="0.25"/>
+      <c:y val="0.25"/>
+      <c:w val="0.5"/>
+      <c:h val="0.5"/>
+    </c:manualLayout>
+  </c:layout>
 </c:chartSpace>
 </file>
 

</xml_diff>